<commit_message>
Deploy website Thu Jul 11 04:34:22 PM PDT 2024
</commit_message>
<xml_diff>
--- a/assets/slides/su24/14-OOP.pptx
+++ b/assets/slides/su24/14-OOP.pptx
@@ -9736,6 +9736,59 @@
           </a:p>
         </p:txBody>
       </p:sp>
+      <p:sp>
+        <p:nvSpPr>
+          <p:cNvPr id="2" name="TextBox 1">
+            <a:extLst>
+              <a:ext uri="{FF2B5EF4-FFF2-40B4-BE49-F238E27FC236}">
+                <a16:creationId xmlns:a16="http://schemas.microsoft.com/office/drawing/2014/main" id="{F234EFED-E0B5-755E-3251-DA314BB15BC0}"/>
+              </a:ext>
+            </a:extLst>
+          </p:cNvPr>
+          <p:cNvSpPr txBox="1"/>
+          <p:nvPr/>
+        </p:nvSpPr>
+        <p:spPr>
+          <a:xfrm>
+            <a:off x="10419330" y="6553200"/>
+            <a:ext cx="1981200" cy="215444"/>
+          </a:xfrm>
+          <a:prstGeom prst="rect">
+            <a:avLst/>
+          </a:prstGeom>
+          <a:noFill/>
+        </p:spPr>
+        <p:txBody>
+          <a:bodyPr wrap="square" rtlCol="0">
+            <a:spAutoFit/>
+          </a:bodyPr>
+          <a:lstStyle/>
+          <a:p>
+            <a:pPr algn="ctr"/>
+            <a:r>
+              <a:rPr lang="en-US" sz="800" dirty="0">
+                <a:solidFill>
+                  <a:schemeClr val="bg1"/>
+                </a:solidFill>
+              </a:rPr>
+              <a:t>Rev1: 2024-07-11 3:55 pm </a:t>
+            </a:r>
+            <a:r>
+              <a:rPr lang="en-US" sz="800" dirty="0" err="1">
+                <a:solidFill>
+                  <a:schemeClr val="bg1"/>
+                </a:solidFill>
+              </a:rPr>
+              <a:t>pst</a:t>
+            </a:r>
+            <a:endParaRPr lang="en-US" sz="800" dirty="0">
+              <a:solidFill>
+                <a:schemeClr val="bg1"/>
+              </a:solidFill>
+            </a:endParaRPr>
+          </a:p>
+        </p:txBody>
+      </p:sp>
     </p:spTree>
     <p:extLst>
       <p:ext uri="{BB962C8B-B14F-4D97-AF65-F5344CB8AC3E}">
@@ -19118,7 +19171,33 @@
                 </a:highlight>
                 <a:latin typeface="Consolas" panose="020B0609020204030204" pitchFamily="49" charset="0"/>
               </a:rPr>
-              <a:t> balance(self):</a:t>
+              <a:t> </a:t>
+            </a:r>
+            <a:r>
+              <a:rPr lang="en-US" b="0" dirty="0" err="1">
+                <a:solidFill>
+                  <a:srgbClr val="000000"/>
+                </a:solidFill>
+                <a:effectLst/>
+                <a:highlight>
+                  <a:srgbClr val="FFFFFF"/>
+                </a:highlight>
+                <a:latin typeface="Consolas" panose="020B0609020204030204" pitchFamily="49" charset="0"/>
+              </a:rPr>
+              <a:t>get_balance</a:t>
+            </a:r>
+            <a:r>
+              <a:rPr lang="en-US" b="0" dirty="0">
+                <a:solidFill>
+                  <a:srgbClr val="000000"/>
+                </a:solidFill>
+                <a:effectLst/>
+                <a:highlight>
+                  <a:srgbClr val="FFFFFF"/>
+                </a:highlight>
+                <a:latin typeface="Consolas" panose="020B0609020204030204" pitchFamily="49" charset="0"/>
+              </a:rPr>
+              <a:t>(self):</a:t>
             </a:r>
           </a:p>
           <a:p>
@@ -20591,7 +20670,33 @@
                 </a:highlight>
                 <a:latin typeface="Consolas" panose="020B0609020204030204" pitchFamily="49" charset="0"/>
               </a:rPr>
-              <a:t> balance(self):</a:t>
+              <a:t> </a:t>
+            </a:r>
+            <a:r>
+              <a:rPr lang="en-US" b="0" dirty="0" err="1">
+                <a:solidFill>
+                  <a:srgbClr val="000000"/>
+                </a:solidFill>
+                <a:effectLst/>
+                <a:highlight>
+                  <a:srgbClr val="FFFFFF"/>
+                </a:highlight>
+                <a:latin typeface="Consolas" panose="020B0609020204030204" pitchFamily="49" charset="0"/>
+              </a:rPr>
+              <a:t>get_balance</a:t>
+            </a:r>
+            <a:r>
+              <a:rPr lang="en-US" b="0" dirty="0">
+                <a:solidFill>
+                  <a:srgbClr val="000000"/>
+                </a:solidFill>
+                <a:effectLst/>
+                <a:highlight>
+                  <a:srgbClr val="FFFFFF"/>
+                </a:highlight>
+                <a:latin typeface="Consolas" panose="020B0609020204030204" pitchFamily="49" charset="0"/>
+              </a:rPr>
+              <a:t>(self):</a:t>
             </a:r>
           </a:p>
           <a:p>
@@ -20952,7 +21057,7 @@
         <p:spPr>
           <a:xfrm>
             <a:off x="6629400" y="1143000"/>
-            <a:ext cx="5791200" cy="3970318"/>
+            <a:ext cx="5791200" cy="4524315"/>
           </a:xfrm>
           <a:prstGeom prst="rect">
             <a:avLst/>
@@ -21359,6 +21464,69 @@
                   <a:srgbClr val="000000"/>
                 </a:solidFill>
                 <a:effectLst/>
+                <a:highlight>
+                  <a:srgbClr val="FFFFFF"/>
+                </a:highlight>
+                <a:latin typeface="Consolas" panose="020B0609020204030204" pitchFamily="49" charset="0"/>
+              </a:rPr>
+              <a:t>my_account.get_balance</a:t>
+            </a:r>
+            <a:r>
+              <a:rPr lang="en-US" b="0" dirty="0">
+                <a:solidFill>
+                  <a:srgbClr val="000000"/>
+                </a:solidFill>
+                <a:effectLst/>
+                <a:highlight>
+                  <a:srgbClr val="FFFFFF"/>
+                </a:highlight>
+                <a:latin typeface="Consolas" panose="020B0609020204030204" pitchFamily="49" charset="0"/>
+              </a:rPr>
+              <a:t>()</a:t>
+            </a:r>
+            <a:endParaRPr lang="en-US" dirty="0">
+              <a:solidFill>
+                <a:srgbClr val="000000"/>
+              </a:solidFill>
+              <a:highlight>
+                <a:srgbClr val="FFFFFF"/>
+              </a:highlight>
+              <a:latin typeface="Consolas" panose="020B0609020204030204" pitchFamily="49" charset="0"/>
+            </a:endParaRPr>
+          </a:p>
+          <a:p>
+            <a:r>
+              <a:rPr lang="en-US" b="0" dirty="0">
+                <a:solidFill>
+                  <a:srgbClr val="000000"/>
+                </a:solidFill>
+                <a:effectLst/>
+                <a:highlight>
+                  <a:srgbClr val="FFFFFF"/>
+                </a:highlight>
+                <a:latin typeface="Consolas" panose="020B0609020204030204" pitchFamily="49" charset="0"/>
+              </a:rPr>
+              <a:t>95</a:t>
+            </a:r>
+          </a:p>
+          <a:p>
+            <a:r>
+              <a:rPr lang="en-US" dirty="0">
+                <a:solidFill>
+                  <a:srgbClr val="000000"/>
+                </a:solidFill>
+                <a:highlight>
+                  <a:srgbClr val="FFFFFF"/>
+                </a:highlight>
+                <a:latin typeface="Consolas" panose="020B0609020204030204" pitchFamily="49" charset="0"/>
+              </a:rPr>
+              <a:t>&gt;&gt;&gt; </a:t>
+            </a:r>
+            <a:r>
+              <a:rPr lang="en-US" dirty="0" err="1">
+                <a:solidFill>
+                  <a:srgbClr val="000000"/>
+                </a:solidFill>
                 <a:highlight>
                   <a:srgbClr val="FFFFFF"/>
                 </a:highlight>

</xml_diff>